<commit_message>
aligned coord systems of IMU and kinematics
</commit_message>
<xml_diff>
--- a/docs/documentation.pptx
+++ b/docs/documentation.pptx
@@ -154,607 +154,607 @@
                 <c:formatCode>General</c:formatCode>
                 <c:ptCount val="201"/>
                 <c:pt idx="0">
-                  <c:v>89.991828383633575</c:v>
+                  <c:v>-89.991828383633575</c:v>
                 </c:pt>
                 <c:pt idx="1">
-                  <c:v>89.990969010356906</c:v>
+                  <c:v>-89.990969010356906</c:v>
                 </c:pt>
                 <c:pt idx="2">
-                  <c:v>89.99001926554989</c:v>
+                  <c:v>-89.99001926554989</c:v>
                 </c:pt>
                 <c:pt idx="3">
-                  <c:v>89.988969646868995</c:v>
+                  <c:v>-89.988969646868995</c:v>
                 </c:pt>
                 <c:pt idx="4">
-                  <c:v>89.987809653068467</c:v>
+                  <c:v>-89.987809653068467</c:v>
                 </c:pt>
                 <c:pt idx="5">
-                  <c:v>89.986527679048109</c:v>
+                  <c:v>-89.986527679048109</c:v>
                 </c:pt>
                 <c:pt idx="6">
-                  <c:v>89.98511089988672</c:v>
+                  <c:v>-89.98511089988672</c:v>
                 </c:pt>
                 <c:pt idx="7">
-                  <c:v>89.983545142706603</c:v>
+                  <c:v>-89.983545142706603</c:v>
                 </c:pt>
                 <c:pt idx="8">
+                  <c:v>-89.981814745096599</c:v>
+                </c:pt>
+                <c:pt idx="9">
+                  <c:v>-89.979902398686676</c:v>
+                </c:pt>
+                <c:pt idx="10">
+                  <c:v>-89.977788976322458</c:v>
+                </c:pt>
+                <c:pt idx="11">
+                  <c:v>-89.975453341125672</c:v>
+                </c:pt>
+                <c:pt idx="12">
+                  <c:v>-89.972872135549252</c:v>
+                </c:pt>
+                <c:pt idx="13">
+                  <c:v>-89.97001954834009</c:v>
+                </c:pt>
+                <c:pt idx="14">
+                  <c:v>-89.966867057106583</c:v>
+                </c:pt>
+                <c:pt idx="15">
+                  <c:v>-89.963383143950068</c:v>
+                </c:pt>
+                <c:pt idx="16">
+                  <c:v>-89.959532981357995</c:v>
+                </c:pt>
+                <c:pt idx="17">
+                  <c:v>-89.955278085268901</c:v>
+                </c:pt>
+                <c:pt idx="18">
+                  <c:v>-89.950575931901739</c:v>
+                </c:pt>
+                <c:pt idx="19">
+                  <c:v>-89.945379534594807</c:v>
+                </c:pt>
+                <c:pt idx="20">
+                  <c:v>-89.939636976516056</c:v>
+                </c:pt>
+                <c:pt idx="21">
+                  <c:v>-89.933290894687232</c:v>
+                </c:pt>
+                <c:pt idx="22">
+                  <c:v>-89.926277910302503</c:v>
+                </c:pt>
+                <c:pt idx="23">
+                  <c:v>-89.918527999816718</c:v>
+                </c:pt>
+                <c:pt idx="24">
+                  <c:v>-89.909963800725691</c:v>
+                </c:pt>
+                <c:pt idx="25">
+                  <c:v>-89.90049984535375</c:v>
+                </c:pt>
+                <c:pt idx="26">
+                  <c:v>-89.890041715301805</c:v>
+                </c:pt>
+                <c:pt idx="27">
+                  <c:v>-89.878485108486103</c:v>
+                </c:pt>
+                <c:pt idx="28">
+                  <c:v>-89.865714809909392</c:v>
+                </c:pt>
+                <c:pt idx="29">
+                  <c:v>-89.851603556448296</c:v>
+                </c:pt>
+                <c:pt idx="30">
+                  <c:v>-89.836010785007886</c:v>
+                </c:pt>
+                <c:pt idx="31">
+                  <c:v>-89.818781252384596</c:v>
+                </c:pt>
+                <c:pt idx="32">
+                  <c:v>-89.799743514085165</c:v>
+                </c:pt>
+                <c:pt idx="33">
+                  <c:v>-89.778708248170076</c:v>
+                </c:pt>
+                <c:pt idx="34">
+                  <c:v>-89.7554664089228</c:v>
+                </c:pt>
+                <c:pt idx="35">
+                  <c:v>-89.729787193787331</c:v>
+                </c:pt>
+                <c:pt idx="36">
+                  <c:v>-89.701415805568601</c:v>
+                </c:pt>
+                <c:pt idx="37">
+                  <c:v>-89.670070990351292</c:v>
+                </c:pt>
+                <c:pt idx="38">
+                  <c:v>-89.635442329971013</c:v>
+                </c:pt>
+                <c:pt idx="39">
+                  <c:v>-89.597187266170252</c:v>
+                </c:pt>
+                <c:pt idx="40">
+                  <c:v>-89.554927831805756</c:v>
+                </c:pt>
+                <c:pt idx="41">
+                  <c:v>-89.508247062658029</c:v>
+                </c:pt>
+                <c:pt idx="42">
+                  <c:v>-89.456685061552506</c:v>
+                </c:pt>
+                <c:pt idx="43">
+                  <c:v>-89.399734684665603</c:v>
+                </c:pt>
+                <c:pt idx="44">
+                  <c:v>-89.336836818101546</c:v>
+                </c:pt>
+                <c:pt idx="45">
+                  <c:v>-89.267375211138713</c:v>
+                </c:pt>
+                <c:pt idx="46">
+                  <c:v>-89.190670831030587</c:v>
+                </c:pt>
+                <c:pt idx="47">
+                  <c:v>-89.105975702989738</c:v>
+                </c:pt>
+                <c:pt idx="48">
+                  <c:v>-89.012466198098906</c:v>
+                </c:pt>
+                <c:pt idx="49">
+                  <c:v>-88.90923573151484</c:v>
+                </c:pt>
+                <c:pt idx="50">
+                  <c:v>-88.795286833628708</c:v>
+                </c:pt>
+                <c:pt idx="51">
+                  <c:v>-88.669522558029257</c:v>
+                </c:pt>
+                <c:pt idx="52">
+                  <c:v>-88.530737192431218</c:v>
+                </c:pt>
+                <c:pt idx="53">
+                  <c:v>-88.377606242487374</c:v>
+                </c:pt>
+                <c:pt idx="54">
+                  <c:v>-88.208675663957237</c:v>
+                </c:pt>
+                <c:pt idx="55">
+                  <c:v>-88.022350326493225</c:v>
+                </c:pt>
+                <c:pt idx="56">
+                  <c:v>-87.816881702830628</c:v>
+                </c:pt>
+                <c:pt idx="57">
+                  <c:v>-87.590354791020317</c:v>
+                </c:pt>
+                <c:pt idx="58">
+                  <c:v>-87.340674295210846</c:v>
+                </c:pt>
+                <c:pt idx="59">
+                  <c:v>-87.065550113140603</c:v>
+                </c:pt>
+                <c:pt idx="60">
+                  <c:v>-86.76248220682352</c:v>
+                </c:pt>
+                <c:pt idx="61">
+                  <c:v>-86.42874496786601</c:v>
+                </c:pt>
+                <c:pt idx="62">
+                  <c:v>-86.061371231496494</c:v>
+                </c:pt>
+                <c:pt idx="63">
+                  <c:v>-85.657136144819503</c:v>
+                </c:pt>
+                <c:pt idx="64">
+                  <c:v>-85.212541156164122</c:v>
+                </c:pt>
+                <c:pt idx="65">
+                  <c:v>-84.723798464755859</c:v>
+                </c:pt>
+                <c:pt idx="66">
+                  <c:v>-84.186816354278903</c:v>
+                </c:pt>
+                <c:pt idx="67">
+                  <c:v>-83.597185930925448</c:v>
+                </c:pt>
+                <c:pt idx="68">
+                  <c:v>-82.950169896582381</c:v>
+                </c:pt>
+                <c:pt idx="69">
+                  <c:v>-82.240694110604451</c:v>
+                </c:pt>
+                <c:pt idx="70">
+                  <c:v>-81.463342828037923</c:v>
+                </c:pt>
+                <c:pt idx="71">
+                  <c:v>-80.612358645884754</c:v>
+                </c:pt>
+                <c:pt idx="72">
+                  <c:v>-79.681648338203573</c:v>
+                </c:pt>
+                <c:pt idx="73">
+                  <c:v>-78.664795909740576</c:v>
+                </c:pt>
+                <c:pt idx="74">
+                  <c:v>-77.555084338197489</c:v>
+                </c:pt>
+                <c:pt idx="75">
+                  <c:v>-76.345527596176055</c:v>
+                </c:pt>
+                <c:pt idx="76">
+                  <c:v>-75.028914631093883</c:v>
+                </c:pt>
+                <c:pt idx="77">
+                  <c:v>-73.597867017325783</c:v>
+                </c:pt>
+                <c:pt idx="78">
+                  <c:v>-72.044911958456581</c:v>
+                </c:pt>
+                <c:pt idx="79">
+                  <c:v>-70.362572184789556</c:v>
+                </c:pt>
+                <c:pt idx="80">
+                  <c:v>-68.543474036018694</c:v>
+                </c:pt>
+                <c:pt idx="81">
+                  <c:v>-66.580474614660218</c:v>
+                </c:pt>
+                <c:pt idx="82">
+                  <c:v>-64.466808317912026</c:v>
+                </c:pt>
+                <c:pt idx="83">
+                  <c:v>-62.196252284963585</c:v>
+                </c:pt>
+                <c:pt idx="84">
+                  <c:v>-59.763309324106203</c:v>
+                </c:pt>
+                <c:pt idx="85">
+                  <c:v>-57.163405714855656</c:v>
+                </c:pt>
+                <c:pt idx="86">
+                  <c:v>-54.393099940544502</c:v>
+                </c:pt>
+                <c:pt idx="87">
+                  <c:v>-51.450296947660313</c:v>
+                </c:pt>
+                <c:pt idx="88">
+                  <c:v>-48.33446102982294</c:v>
+                </c:pt>
+                <c:pt idx="89">
+                  <c:v>-45.046819007120902</c:v>
+                </c:pt>
+                <c:pt idx="90">
+                  <c:v>-41.590544153400621</c:v>
+                </c:pt>
+                <c:pt idx="91">
+                  <c:v>-37.970910472500442</c:v>
+                </c:pt>
+                <c:pt idx="92">
+                  <c:v>-34.195406602969953</c:v>
+                </c:pt>
+                <c:pt idx="93">
+                  <c:v>-30.273798990269608</c:v>
+                </c:pt>
+                <c:pt idx="94">
+                  <c:v>-26.21813512064287</c:v>
+                </c:pt>
+                <c:pt idx="95">
+                  <c:v>-22.042679616333487</c:v>
+                </c:pt>
+                <c:pt idx="96">
+                  <c:v>-17.763778820241022</c:v>
+                </c:pt>
+                <c:pt idx="97">
+                  <c:v>-13.399653026098285</c:v>
+                </c:pt>
+                <c:pt idx="98">
+                  <c:v>-8.9701195162456919</c:v>
+                </c:pt>
+                <c:pt idx="99">
+                  <c:v>-4.496253746208863</c:v>
+                </c:pt>
+                <c:pt idx="100">
+                  <c:v>3.397282455352979E-13</c:v>
+                </c:pt>
+                <c:pt idx="101">
+                  <c:v>4.496253746209522</c:v>
+                </c:pt>
+                <c:pt idx="102">
+                  <c:v>8.9701195162463616</c:v>
+                </c:pt>
+                <c:pt idx="103">
+                  <c:v>13.399653026098955</c:v>
+                </c:pt>
+                <c:pt idx="104">
+                  <c:v>17.763778820241701</c:v>
+                </c:pt>
+                <c:pt idx="105">
+                  <c:v>22.042679616334148</c:v>
+                </c:pt>
+                <c:pt idx="106">
+                  <c:v>26.218135120643492</c:v>
+                </c:pt>
+                <c:pt idx="107">
+                  <c:v>30.273798990270198</c:v>
+                </c:pt>
+                <c:pt idx="108">
+                  <c:v>34.195406602970529</c:v>
+                </c:pt>
+                <c:pt idx="109">
+                  <c:v>37.970910472500989</c:v>
+                </c:pt>
+                <c:pt idx="110">
+                  <c:v>41.59054415340114</c:v>
+                </c:pt>
+                <c:pt idx="111">
+                  <c:v>45.046819007121421</c:v>
+                </c:pt>
+                <c:pt idx="112">
+                  <c:v>48.334461029823416</c:v>
+                </c:pt>
+                <c:pt idx="113">
+                  <c:v>51.450296947660767</c:v>
+                </c:pt>
+                <c:pt idx="114">
+                  <c:v>54.393099940544921</c:v>
+                </c:pt>
+                <c:pt idx="115">
+                  <c:v>57.163405714856054</c:v>
+                </c:pt>
+                <c:pt idx="116">
+                  <c:v>59.763309324106601</c:v>
+                </c:pt>
+                <c:pt idx="117">
+                  <c:v>62.196252284963933</c:v>
+                </c:pt>
+                <c:pt idx="118">
+                  <c:v>64.466808317912367</c:v>
+                </c:pt>
+                <c:pt idx="119">
+                  <c:v>66.580474614660545</c:v>
+                </c:pt>
+                <c:pt idx="120">
+                  <c:v>68.543474036018992</c:v>
+                </c:pt>
+                <c:pt idx="121">
+                  <c:v>70.362572184789812</c:v>
+                </c:pt>
+                <c:pt idx="122">
+                  <c:v>72.044911958456808</c:v>
+                </c:pt>
+                <c:pt idx="123">
+                  <c:v>73.597867017326024</c:v>
+                </c:pt>
+                <c:pt idx="124">
+                  <c:v>75.028914631094082</c:v>
+                </c:pt>
+                <c:pt idx="125">
+                  <c:v>76.345527596176268</c:v>
+                </c:pt>
+                <c:pt idx="126">
+                  <c:v>77.555084338197673</c:v>
+                </c:pt>
+                <c:pt idx="127">
+                  <c:v>78.664795909740732</c:v>
+                </c:pt>
+                <c:pt idx="128">
+                  <c:v>79.681648338203701</c:v>
+                </c:pt>
+                <c:pt idx="129">
+                  <c:v>80.612358645884882</c:v>
+                </c:pt>
+                <c:pt idx="130">
+                  <c:v>81.463342828038051</c:v>
+                </c:pt>
+                <c:pt idx="131">
+                  <c:v>82.240694110604565</c:v>
+                </c:pt>
+                <c:pt idx="132">
+                  <c:v>82.95016989658248</c:v>
+                </c:pt>
+                <c:pt idx="133">
+                  <c:v>83.597185930925548</c:v>
+                </c:pt>
+                <c:pt idx="134">
+                  <c:v>84.18681635427896</c:v>
+                </c:pt>
+                <c:pt idx="135">
+                  <c:v>84.723798464755916</c:v>
+                </c:pt>
+                <c:pt idx="136">
+                  <c:v>85.212541156164193</c:v>
+                </c:pt>
+                <c:pt idx="137">
+                  <c:v>85.657136144819589</c:v>
+                </c:pt>
+                <c:pt idx="138">
+                  <c:v>86.061371231496551</c:v>
+                </c:pt>
+                <c:pt idx="139">
+                  <c:v>86.428744967866081</c:v>
+                </c:pt>
+                <c:pt idx="140">
+                  <c:v>86.762482206823549</c:v>
+                </c:pt>
+                <c:pt idx="141">
+                  <c:v>87.06555011314066</c:v>
+                </c:pt>
+                <c:pt idx="142">
+                  <c:v>87.340674295210874</c:v>
+                </c:pt>
+                <c:pt idx="143">
+                  <c:v>87.59035479102036</c:v>
+                </c:pt>
+                <c:pt idx="144">
+                  <c:v>87.816881702830656</c:v>
+                </c:pt>
+                <c:pt idx="145">
+                  <c:v>88.022350326493239</c:v>
+                </c:pt>
+                <c:pt idx="146">
+                  <c:v>88.208675663957251</c:v>
+                </c:pt>
+                <c:pt idx="147">
+                  <c:v>88.377606242487417</c:v>
+                </c:pt>
+                <c:pt idx="148">
+                  <c:v>88.530737192431232</c:v>
+                </c:pt>
+                <c:pt idx="149">
+                  <c:v>88.669522558029257</c:v>
+                </c:pt>
+                <c:pt idx="150">
+                  <c:v>88.795286833628737</c:v>
+                </c:pt>
+                <c:pt idx="151">
+                  <c:v>88.909235731514869</c:v>
+                </c:pt>
+                <c:pt idx="152">
+                  <c:v>89.012466198098934</c:v>
+                </c:pt>
+                <c:pt idx="153">
+                  <c:v>89.105975702989753</c:v>
+                </c:pt>
+                <c:pt idx="154">
+                  <c:v>89.190670831030587</c:v>
+                </c:pt>
+                <c:pt idx="155">
+                  <c:v>89.267375211138699</c:v>
+                </c:pt>
+                <c:pt idx="156">
+                  <c:v>89.336836818101531</c:v>
+                </c:pt>
+                <c:pt idx="157">
+                  <c:v>89.399734684665603</c:v>
+                </c:pt>
+                <c:pt idx="158">
+                  <c:v>89.456685061552491</c:v>
+                </c:pt>
+                <c:pt idx="159">
+                  <c:v>89.508247062658015</c:v>
+                </c:pt>
+                <c:pt idx="160">
+                  <c:v>89.554927831805742</c:v>
+                </c:pt>
+                <c:pt idx="161">
+                  <c:v>89.597187266170266</c:v>
+                </c:pt>
+                <c:pt idx="162">
+                  <c:v>89.635442329971028</c:v>
+                </c:pt>
+                <c:pt idx="163">
+                  <c:v>89.670070990351306</c:v>
+                </c:pt>
+                <c:pt idx="164">
+                  <c:v>89.701415805568601</c:v>
+                </c:pt>
+                <c:pt idx="165">
+                  <c:v>89.729787193787345</c:v>
+                </c:pt>
+                <c:pt idx="166">
+                  <c:v>89.755466408922786</c:v>
+                </c:pt>
+                <c:pt idx="167">
+                  <c:v>89.778708248170062</c:v>
+                </c:pt>
+                <c:pt idx="168">
+                  <c:v>89.799743514085137</c:v>
+                </c:pt>
+                <c:pt idx="169">
+                  <c:v>89.818781252384596</c:v>
+                </c:pt>
+                <c:pt idx="170">
+                  <c:v>89.836010785007886</c:v>
+                </c:pt>
+                <c:pt idx="171">
+                  <c:v>89.85160355644831</c:v>
+                </c:pt>
+                <c:pt idx="172">
+                  <c:v>89.865714809909392</c:v>
+                </c:pt>
+                <c:pt idx="173">
+                  <c:v>89.878485108486089</c:v>
+                </c:pt>
+                <c:pt idx="174">
+                  <c:v>89.890041715301805</c:v>
+                </c:pt>
+                <c:pt idx="175">
+                  <c:v>89.90049984535375</c:v>
+                </c:pt>
+                <c:pt idx="176">
+                  <c:v>89.909963800725677</c:v>
+                </c:pt>
+                <c:pt idx="177">
+                  <c:v>89.918527999816703</c:v>
+                </c:pt>
+                <c:pt idx="178">
+                  <c:v>89.926277910302517</c:v>
+                </c:pt>
+                <c:pt idx="179">
+                  <c:v>89.933290894687246</c:v>
+                </c:pt>
+                <c:pt idx="180">
+                  <c:v>89.939636976516027</c:v>
+                </c:pt>
+                <c:pt idx="181">
+                  <c:v>89.945379534594792</c:v>
+                </c:pt>
+                <c:pt idx="182">
+                  <c:v>89.950575931901767</c:v>
+                </c:pt>
+                <c:pt idx="183">
+                  <c:v>89.955278085268915</c:v>
+                </c:pt>
+                <c:pt idx="184">
+                  <c:v>89.959532981358009</c:v>
+                </c:pt>
+                <c:pt idx="185">
+                  <c:v>89.963383143950068</c:v>
+                </c:pt>
+                <c:pt idx="186">
+                  <c:v>89.966867057106583</c:v>
+                </c:pt>
+                <c:pt idx="187">
+                  <c:v>89.970019548340076</c:v>
+                </c:pt>
+                <c:pt idx="188">
+                  <c:v>89.972872135549252</c:v>
+                </c:pt>
+                <c:pt idx="189">
+                  <c:v>89.9754533411257</c:v>
+                </c:pt>
+                <c:pt idx="190">
+                  <c:v>89.977788976322472</c:v>
+                </c:pt>
+                <c:pt idx="191">
+                  <c:v>89.979902398686676</c:v>
+                </c:pt>
+                <c:pt idx="192">
                   <c:v>89.981814745096599</c:v>
                 </c:pt>
-                <c:pt idx="9">
-                  <c:v>89.979902398686676</c:v>
-                </c:pt>
-                <c:pt idx="10">
-                  <c:v>89.977788976322458</c:v>
-                </c:pt>
-                <c:pt idx="11">
-                  <c:v>89.975453341125672</c:v>
-                </c:pt>
-                <c:pt idx="12">
-                  <c:v>89.972872135549252</c:v>
-                </c:pt>
-                <c:pt idx="13">
-                  <c:v>89.97001954834009</c:v>
-                </c:pt>
-                <c:pt idx="14">
-                  <c:v>89.966867057106583</c:v>
-                </c:pt>
-                <c:pt idx="15">
-                  <c:v>89.963383143950068</c:v>
-                </c:pt>
-                <c:pt idx="16">
-                  <c:v>89.959532981357995</c:v>
-                </c:pt>
-                <c:pt idx="17">
-                  <c:v>89.955278085268901</c:v>
-                </c:pt>
-                <c:pt idx="18">
-                  <c:v>89.950575931901739</c:v>
-                </c:pt>
-                <c:pt idx="19">
-                  <c:v>89.945379534594807</c:v>
-                </c:pt>
-                <c:pt idx="20">
-                  <c:v>89.939636976516056</c:v>
-                </c:pt>
-                <c:pt idx="21">
-                  <c:v>89.933290894687232</c:v>
-                </c:pt>
-                <c:pt idx="22">
-                  <c:v>89.926277910302503</c:v>
-                </c:pt>
-                <c:pt idx="23">
-                  <c:v>89.918527999816718</c:v>
-                </c:pt>
-                <c:pt idx="24">
-                  <c:v>89.909963800725691</c:v>
-                </c:pt>
-                <c:pt idx="25">
-                  <c:v>89.90049984535375</c:v>
-                </c:pt>
-                <c:pt idx="26">
-                  <c:v>89.890041715301805</c:v>
-                </c:pt>
-                <c:pt idx="27">
-                  <c:v>89.878485108486103</c:v>
-                </c:pt>
-                <c:pt idx="28">
-                  <c:v>89.865714809909392</c:v>
-                </c:pt>
-                <c:pt idx="29">
-                  <c:v>89.851603556448296</c:v>
-                </c:pt>
-                <c:pt idx="30">
-                  <c:v>89.836010785007886</c:v>
-                </c:pt>
-                <c:pt idx="31">
-                  <c:v>89.818781252384596</c:v>
-                </c:pt>
-                <c:pt idx="32">
-                  <c:v>89.799743514085165</c:v>
-                </c:pt>
-                <c:pt idx="33">
-                  <c:v>89.778708248170076</c:v>
-                </c:pt>
-                <c:pt idx="34">
-                  <c:v>89.7554664089228</c:v>
-                </c:pt>
-                <c:pt idx="35">
-                  <c:v>89.729787193787331</c:v>
-                </c:pt>
-                <c:pt idx="36">
-                  <c:v>89.701415805568601</c:v>
-                </c:pt>
-                <c:pt idx="37">
-                  <c:v>89.670070990351292</c:v>
-                </c:pt>
-                <c:pt idx="38">
-                  <c:v>89.635442329971013</c:v>
-                </c:pt>
-                <c:pt idx="39">
-                  <c:v>89.597187266170252</c:v>
-                </c:pt>
-                <c:pt idx="40">
-                  <c:v>89.554927831805756</c:v>
-                </c:pt>
-                <c:pt idx="41">
-                  <c:v>89.508247062658029</c:v>
-                </c:pt>
-                <c:pt idx="42">
-                  <c:v>89.456685061552506</c:v>
-                </c:pt>
-                <c:pt idx="43">
-                  <c:v>89.399734684665603</c:v>
-                </c:pt>
-                <c:pt idx="44">
-                  <c:v>89.336836818101546</c:v>
-                </c:pt>
-                <c:pt idx="45">
-                  <c:v>89.267375211138713</c:v>
-                </c:pt>
-                <c:pt idx="46">
-                  <c:v>89.190670831030587</c:v>
-                </c:pt>
-                <c:pt idx="47">
-                  <c:v>89.105975702989738</c:v>
-                </c:pt>
-                <c:pt idx="48">
-                  <c:v>89.012466198098906</c:v>
-                </c:pt>
-                <c:pt idx="49">
-                  <c:v>88.90923573151484</c:v>
-                </c:pt>
-                <c:pt idx="50">
-                  <c:v>88.795286833628708</c:v>
-                </c:pt>
-                <c:pt idx="51">
-                  <c:v>88.669522558029257</c:v>
-                </c:pt>
-                <c:pt idx="52">
-                  <c:v>88.530737192431218</c:v>
-                </c:pt>
-                <c:pt idx="53">
-                  <c:v>88.377606242487374</c:v>
-                </c:pt>
-                <c:pt idx="54">
-                  <c:v>88.208675663957237</c:v>
-                </c:pt>
-                <c:pt idx="55">
-                  <c:v>88.022350326493225</c:v>
-                </c:pt>
-                <c:pt idx="56">
-                  <c:v>87.816881702830628</c:v>
-                </c:pt>
-                <c:pt idx="57">
-                  <c:v>87.590354791020317</c:v>
-                </c:pt>
-                <c:pt idx="58">
-                  <c:v>87.340674295210846</c:v>
-                </c:pt>
-                <c:pt idx="59">
-                  <c:v>87.065550113140603</c:v>
-                </c:pt>
-                <c:pt idx="60">
-                  <c:v>86.76248220682352</c:v>
-                </c:pt>
-                <c:pt idx="61">
-                  <c:v>86.42874496786601</c:v>
-                </c:pt>
-                <c:pt idx="62">
-                  <c:v>86.061371231496494</c:v>
-                </c:pt>
-                <c:pt idx="63">
-                  <c:v>85.657136144819503</c:v>
-                </c:pt>
-                <c:pt idx="64">
-                  <c:v>85.212541156164122</c:v>
-                </c:pt>
-                <c:pt idx="65">
-                  <c:v>84.723798464755859</c:v>
-                </c:pt>
-                <c:pt idx="66">
-                  <c:v>84.186816354278903</c:v>
-                </c:pt>
-                <c:pt idx="67">
-                  <c:v>83.597185930925448</c:v>
-                </c:pt>
-                <c:pt idx="68">
-                  <c:v>82.950169896582381</c:v>
-                </c:pt>
-                <c:pt idx="69">
-                  <c:v>82.240694110604451</c:v>
-                </c:pt>
-                <c:pt idx="70">
-                  <c:v>81.463342828037923</c:v>
-                </c:pt>
-                <c:pt idx="71">
-                  <c:v>80.612358645884754</c:v>
-                </c:pt>
-                <c:pt idx="72">
-                  <c:v>79.681648338203573</c:v>
-                </c:pt>
-                <c:pt idx="73">
-                  <c:v>78.664795909740576</c:v>
-                </c:pt>
-                <c:pt idx="74">
-                  <c:v>77.555084338197489</c:v>
-                </c:pt>
-                <c:pt idx="75">
-                  <c:v>76.345527596176055</c:v>
-                </c:pt>
-                <c:pt idx="76">
-                  <c:v>75.028914631093883</c:v>
-                </c:pt>
-                <c:pt idx="77">
-                  <c:v>73.597867017325783</c:v>
-                </c:pt>
-                <c:pt idx="78">
-                  <c:v>72.044911958456581</c:v>
-                </c:pt>
-                <c:pt idx="79">
-                  <c:v>70.362572184789556</c:v>
-                </c:pt>
-                <c:pt idx="80">
-                  <c:v>68.543474036018694</c:v>
-                </c:pt>
-                <c:pt idx="81">
-                  <c:v>66.580474614660218</c:v>
-                </c:pt>
-                <c:pt idx="82">
-                  <c:v>64.466808317912026</c:v>
-                </c:pt>
-                <c:pt idx="83">
-                  <c:v>62.196252284963585</c:v>
-                </c:pt>
-                <c:pt idx="84">
-                  <c:v>59.763309324106203</c:v>
-                </c:pt>
-                <c:pt idx="85">
-                  <c:v>57.163405714855656</c:v>
-                </c:pt>
-                <c:pt idx="86">
-                  <c:v>54.393099940544502</c:v>
-                </c:pt>
-                <c:pt idx="87">
-                  <c:v>51.450296947660313</c:v>
-                </c:pt>
-                <c:pt idx="88">
-                  <c:v>48.33446102982294</c:v>
-                </c:pt>
-                <c:pt idx="89">
-                  <c:v>45.046819007120902</c:v>
-                </c:pt>
-                <c:pt idx="90">
-                  <c:v>41.590544153400621</c:v>
-                </c:pt>
-                <c:pt idx="91">
-                  <c:v>37.970910472500442</c:v>
-                </c:pt>
-                <c:pt idx="92">
-                  <c:v>34.195406602969953</c:v>
-                </c:pt>
-                <c:pt idx="93">
-                  <c:v>30.273798990269608</c:v>
-                </c:pt>
-                <c:pt idx="94">
-                  <c:v>26.21813512064287</c:v>
-                </c:pt>
-                <c:pt idx="95">
-                  <c:v>22.042679616333487</c:v>
-                </c:pt>
-                <c:pt idx="96">
-                  <c:v>17.763778820241022</c:v>
-                </c:pt>
-                <c:pt idx="97">
-                  <c:v>13.399653026098285</c:v>
-                </c:pt>
-                <c:pt idx="98">
-                  <c:v>8.9701195162456919</c:v>
-                </c:pt>
-                <c:pt idx="99">
-                  <c:v>4.496253746208863</c:v>
-                </c:pt>
-                <c:pt idx="100">
-                  <c:v>-3.397282455352979E-13</c:v>
-                </c:pt>
-                <c:pt idx="101">
-                  <c:v>-4.496253746209522</c:v>
-                </c:pt>
-                <c:pt idx="102">
-                  <c:v>-8.9701195162463616</c:v>
-                </c:pt>
-                <c:pt idx="103">
-                  <c:v>-13.399653026098955</c:v>
-                </c:pt>
-                <c:pt idx="104">
-                  <c:v>-17.763778820241701</c:v>
-                </c:pt>
-                <c:pt idx="105">
-                  <c:v>-22.042679616334148</c:v>
-                </c:pt>
-                <c:pt idx="106">
-                  <c:v>-26.218135120643492</c:v>
-                </c:pt>
-                <c:pt idx="107">
-                  <c:v>-30.273798990270198</c:v>
-                </c:pt>
-                <c:pt idx="108">
-                  <c:v>-34.195406602970529</c:v>
-                </c:pt>
-                <c:pt idx="109">
-                  <c:v>-37.970910472500989</c:v>
-                </c:pt>
-                <c:pt idx="110">
-                  <c:v>-41.59054415340114</c:v>
-                </c:pt>
-                <c:pt idx="111">
-                  <c:v>-45.046819007121421</c:v>
-                </c:pt>
-                <c:pt idx="112">
-                  <c:v>-48.334461029823416</c:v>
-                </c:pt>
-                <c:pt idx="113">
-                  <c:v>-51.450296947660767</c:v>
-                </c:pt>
-                <c:pt idx="114">
-                  <c:v>-54.393099940544921</c:v>
-                </c:pt>
-                <c:pt idx="115">
-                  <c:v>-57.163405714856054</c:v>
-                </c:pt>
-                <c:pt idx="116">
-                  <c:v>-59.763309324106601</c:v>
-                </c:pt>
-                <c:pt idx="117">
-                  <c:v>-62.196252284963933</c:v>
-                </c:pt>
-                <c:pt idx="118">
-                  <c:v>-64.466808317912367</c:v>
-                </c:pt>
-                <c:pt idx="119">
-                  <c:v>-66.580474614660545</c:v>
-                </c:pt>
-                <c:pt idx="120">
-                  <c:v>-68.543474036018992</c:v>
-                </c:pt>
-                <c:pt idx="121">
-                  <c:v>-70.362572184789812</c:v>
-                </c:pt>
-                <c:pt idx="122">
-                  <c:v>-72.044911958456808</c:v>
-                </c:pt>
-                <c:pt idx="123">
-                  <c:v>-73.597867017326024</c:v>
-                </c:pt>
-                <c:pt idx="124">
-                  <c:v>-75.028914631094082</c:v>
-                </c:pt>
-                <c:pt idx="125">
-                  <c:v>-76.345527596176268</c:v>
-                </c:pt>
-                <c:pt idx="126">
-                  <c:v>-77.555084338197673</c:v>
-                </c:pt>
-                <c:pt idx="127">
-                  <c:v>-78.664795909740732</c:v>
-                </c:pt>
-                <c:pt idx="128">
-                  <c:v>-79.681648338203701</c:v>
-                </c:pt>
-                <c:pt idx="129">
-                  <c:v>-80.612358645884882</c:v>
-                </c:pt>
-                <c:pt idx="130">
-                  <c:v>-81.463342828038051</c:v>
-                </c:pt>
-                <c:pt idx="131">
-                  <c:v>-82.240694110604565</c:v>
-                </c:pt>
-                <c:pt idx="132">
-                  <c:v>-82.95016989658248</c:v>
-                </c:pt>
-                <c:pt idx="133">
-                  <c:v>-83.597185930925548</c:v>
-                </c:pt>
-                <c:pt idx="134">
-                  <c:v>-84.18681635427896</c:v>
-                </c:pt>
-                <c:pt idx="135">
-                  <c:v>-84.723798464755916</c:v>
-                </c:pt>
-                <c:pt idx="136">
-                  <c:v>-85.212541156164193</c:v>
-                </c:pt>
-                <c:pt idx="137">
-                  <c:v>-85.657136144819589</c:v>
-                </c:pt>
-                <c:pt idx="138">
-                  <c:v>-86.061371231496551</c:v>
-                </c:pt>
-                <c:pt idx="139">
-                  <c:v>-86.428744967866081</c:v>
-                </c:pt>
-                <c:pt idx="140">
-                  <c:v>-86.762482206823549</c:v>
-                </c:pt>
-                <c:pt idx="141">
-                  <c:v>-87.06555011314066</c:v>
-                </c:pt>
-                <c:pt idx="142">
-                  <c:v>-87.340674295210874</c:v>
-                </c:pt>
-                <c:pt idx="143">
-                  <c:v>-87.59035479102036</c:v>
-                </c:pt>
-                <c:pt idx="144">
-                  <c:v>-87.816881702830656</c:v>
-                </c:pt>
-                <c:pt idx="145">
-                  <c:v>-88.022350326493239</c:v>
-                </c:pt>
-                <c:pt idx="146">
-                  <c:v>-88.208675663957251</c:v>
-                </c:pt>
-                <c:pt idx="147">
-                  <c:v>-88.377606242487417</c:v>
-                </c:pt>
-                <c:pt idx="148">
-                  <c:v>-88.530737192431232</c:v>
-                </c:pt>
-                <c:pt idx="149">
-                  <c:v>-88.669522558029257</c:v>
-                </c:pt>
-                <c:pt idx="150">
-                  <c:v>-88.795286833628737</c:v>
-                </c:pt>
-                <c:pt idx="151">
-                  <c:v>-88.909235731514869</c:v>
-                </c:pt>
-                <c:pt idx="152">
-                  <c:v>-89.012466198098934</c:v>
-                </c:pt>
-                <c:pt idx="153">
-                  <c:v>-89.105975702989753</c:v>
-                </c:pt>
-                <c:pt idx="154">
-                  <c:v>-89.190670831030587</c:v>
-                </c:pt>
-                <c:pt idx="155">
-                  <c:v>-89.267375211138699</c:v>
-                </c:pt>
-                <c:pt idx="156">
-                  <c:v>-89.336836818101531</c:v>
-                </c:pt>
-                <c:pt idx="157">
-                  <c:v>-89.399734684665603</c:v>
-                </c:pt>
-                <c:pt idx="158">
-                  <c:v>-89.456685061552491</c:v>
-                </c:pt>
-                <c:pt idx="159">
-                  <c:v>-89.508247062658015</c:v>
-                </c:pt>
-                <c:pt idx="160">
-                  <c:v>-89.554927831805742</c:v>
-                </c:pt>
-                <c:pt idx="161">
-                  <c:v>-89.597187266170266</c:v>
-                </c:pt>
-                <c:pt idx="162">
-                  <c:v>-89.635442329971028</c:v>
-                </c:pt>
-                <c:pt idx="163">
-                  <c:v>-89.670070990351306</c:v>
-                </c:pt>
-                <c:pt idx="164">
-                  <c:v>-89.701415805568601</c:v>
-                </c:pt>
-                <c:pt idx="165">
-                  <c:v>-89.729787193787345</c:v>
-                </c:pt>
-                <c:pt idx="166">
-                  <c:v>-89.755466408922786</c:v>
-                </c:pt>
-                <c:pt idx="167">
-                  <c:v>-89.778708248170062</c:v>
-                </c:pt>
-                <c:pt idx="168">
-                  <c:v>-89.799743514085137</c:v>
-                </c:pt>
-                <c:pt idx="169">
-                  <c:v>-89.818781252384596</c:v>
-                </c:pt>
-                <c:pt idx="170">
-                  <c:v>-89.836010785007886</c:v>
-                </c:pt>
-                <c:pt idx="171">
-                  <c:v>-89.85160355644831</c:v>
-                </c:pt>
-                <c:pt idx="172">
-                  <c:v>-89.865714809909392</c:v>
-                </c:pt>
-                <c:pt idx="173">
-                  <c:v>-89.878485108486089</c:v>
-                </c:pt>
-                <c:pt idx="174">
-                  <c:v>-89.890041715301805</c:v>
-                </c:pt>
-                <c:pt idx="175">
-                  <c:v>-89.90049984535375</c:v>
-                </c:pt>
-                <c:pt idx="176">
-                  <c:v>-89.909963800725677</c:v>
-                </c:pt>
-                <c:pt idx="177">
-                  <c:v>-89.918527999816703</c:v>
-                </c:pt>
-                <c:pt idx="178">
-                  <c:v>-89.926277910302517</c:v>
-                </c:pt>
-                <c:pt idx="179">
-                  <c:v>-89.933290894687246</c:v>
-                </c:pt>
-                <c:pt idx="180">
-                  <c:v>-89.939636976516027</c:v>
-                </c:pt>
-                <c:pt idx="181">
-                  <c:v>-89.945379534594792</c:v>
-                </c:pt>
-                <c:pt idx="182">
-                  <c:v>-89.950575931901767</c:v>
-                </c:pt>
-                <c:pt idx="183">
-                  <c:v>-89.955278085268915</c:v>
-                </c:pt>
-                <c:pt idx="184">
-                  <c:v>-89.959532981358009</c:v>
-                </c:pt>
-                <c:pt idx="185">
-                  <c:v>-89.963383143950068</c:v>
-                </c:pt>
-                <c:pt idx="186">
-                  <c:v>-89.966867057106583</c:v>
-                </c:pt>
-                <c:pt idx="187">
-                  <c:v>-89.970019548340076</c:v>
-                </c:pt>
-                <c:pt idx="188">
-                  <c:v>-89.972872135549252</c:v>
-                </c:pt>
-                <c:pt idx="189">
-                  <c:v>-89.9754533411257</c:v>
-                </c:pt>
-                <c:pt idx="190">
-                  <c:v>-89.977788976322472</c:v>
-                </c:pt>
-                <c:pt idx="191">
-                  <c:v>-89.979902398686676</c:v>
-                </c:pt>
-                <c:pt idx="192">
-                  <c:v>-89.981814745096599</c:v>
-                </c:pt>
                 <c:pt idx="193">
-                  <c:v>-89.983545142706618</c:v>
+                  <c:v>89.983545142706618</c:v>
                 </c:pt>
                 <c:pt idx="194">
-                  <c:v>-89.985110899886692</c:v>
+                  <c:v>89.985110899886692</c:v>
                 </c:pt>
                 <c:pt idx="195">
-                  <c:v>-89.986527679048095</c:v>
+                  <c:v>89.986527679048095</c:v>
                 </c:pt>
                 <c:pt idx="196">
-                  <c:v>-89.987809653068439</c:v>
+                  <c:v>89.987809653068439</c:v>
                 </c:pt>
                 <c:pt idx="197">
-                  <c:v>-89.988969646869009</c:v>
+                  <c:v>89.988969646869009</c:v>
                 </c:pt>
                 <c:pt idx="198">
-                  <c:v>-89.990019265549904</c:v>
+                  <c:v>89.990019265549904</c:v>
                 </c:pt>
                 <c:pt idx="199">
-                  <c:v>-89.99096901035692</c:v>
+                  <c:v>89.99096901035692</c:v>
                 </c:pt>
                 <c:pt idx="200">
-                  <c:v>-89.99182838363356</c:v>
+                  <c:v>89.99182838363356</c:v>
                 </c:pt>
               </c:numCache>
             </c:numRef>
@@ -762,7 +762,7 @@
           <c:smooth val="0"/>
           <c:extLst>
             <c:ext xmlns:c16="http://schemas.microsoft.com/office/drawing/2014/chart" uri="{C3380CC4-5D6E-409C-BE32-E72D297353CC}">
-              <c16:uniqueId val="{00000000-2BA4-425B-ADA6-A692E20E77B9}"/>
+              <c16:uniqueId val="{00000000-BF48-4524-AB5C-F5E2985D7C8A}"/>
             </c:ext>
           </c:extLst>
         </c:ser>
@@ -1592,7 +1592,7 @@
           <a:p>
             <a:fld id="{D86E6A5D-0A44-48FB-AC17-40D5FE6D3AAE}" type="datetimeFigureOut">
               <a:rPr lang="de-DE" smtClean="0"/>
-              <a:t>27.10.2018</a:t>
+              <a:t>28.10.2018</a:t>
             </a:fld>
             <a:endParaRPr lang="de-DE"/>
           </a:p>
@@ -1790,7 +1790,7 @@
           <a:p>
             <a:fld id="{D86E6A5D-0A44-48FB-AC17-40D5FE6D3AAE}" type="datetimeFigureOut">
               <a:rPr lang="de-DE" smtClean="0"/>
-              <a:t>27.10.2018</a:t>
+              <a:t>28.10.2018</a:t>
             </a:fld>
             <a:endParaRPr lang="de-DE"/>
           </a:p>
@@ -1998,7 +1998,7 @@
           <a:p>
             <a:fld id="{D86E6A5D-0A44-48FB-AC17-40D5FE6D3AAE}" type="datetimeFigureOut">
               <a:rPr lang="de-DE" smtClean="0"/>
-              <a:t>27.10.2018</a:t>
+              <a:t>28.10.2018</a:t>
             </a:fld>
             <a:endParaRPr lang="de-DE"/>
           </a:p>
@@ -2196,7 +2196,7 @@
           <a:p>
             <a:fld id="{D86E6A5D-0A44-48FB-AC17-40D5FE6D3AAE}" type="datetimeFigureOut">
               <a:rPr lang="de-DE" smtClean="0"/>
-              <a:t>27.10.2018</a:t>
+              <a:t>28.10.2018</a:t>
             </a:fld>
             <a:endParaRPr lang="de-DE"/>
           </a:p>
@@ -2471,7 +2471,7 @@
           <a:p>
             <a:fld id="{D86E6A5D-0A44-48FB-AC17-40D5FE6D3AAE}" type="datetimeFigureOut">
               <a:rPr lang="de-DE" smtClean="0"/>
-              <a:t>27.10.2018</a:t>
+              <a:t>28.10.2018</a:t>
             </a:fld>
             <a:endParaRPr lang="de-DE"/>
           </a:p>
@@ -2736,7 +2736,7 @@
           <a:p>
             <a:fld id="{D86E6A5D-0A44-48FB-AC17-40D5FE6D3AAE}" type="datetimeFigureOut">
               <a:rPr lang="de-DE" smtClean="0"/>
-              <a:t>27.10.2018</a:t>
+              <a:t>28.10.2018</a:t>
             </a:fld>
             <a:endParaRPr lang="de-DE"/>
           </a:p>
@@ -3148,7 +3148,7 @@
           <a:p>
             <a:fld id="{D86E6A5D-0A44-48FB-AC17-40D5FE6D3AAE}" type="datetimeFigureOut">
               <a:rPr lang="de-DE" smtClean="0"/>
-              <a:t>27.10.2018</a:t>
+              <a:t>28.10.2018</a:t>
             </a:fld>
             <a:endParaRPr lang="de-DE"/>
           </a:p>
@@ -3289,7 +3289,7 @@
           <a:p>
             <a:fld id="{D86E6A5D-0A44-48FB-AC17-40D5FE6D3AAE}" type="datetimeFigureOut">
               <a:rPr lang="de-DE" smtClean="0"/>
-              <a:t>27.10.2018</a:t>
+              <a:t>28.10.2018</a:t>
             </a:fld>
             <a:endParaRPr lang="de-DE"/>
           </a:p>
@@ -3402,7 +3402,7 @@
           <a:p>
             <a:fld id="{D86E6A5D-0A44-48FB-AC17-40D5FE6D3AAE}" type="datetimeFigureOut">
               <a:rPr lang="de-DE" smtClean="0"/>
-              <a:t>27.10.2018</a:t>
+              <a:t>28.10.2018</a:t>
             </a:fld>
             <a:endParaRPr lang="de-DE"/>
           </a:p>
@@ -3713,7 +3713,7 @@
           <a:p>
             <a:fld id="{D86E6A5D-0A44-48FB-AC17-40D5FE6D3AAE}" type="datetimeFigureOut">
               <a:rPr lang="de-DE" smtClean="0"/>
-              <a:t>27.10.2018</a:t>
+              <a:t>28.10.2018</a:t>
             </a:fld>
             <a:endParaRPr lang="de-DE"/>
           </a:p>
@@ -4001,7 +4001,7 @@
           <a:p>
             <a:fld id="{D86E6A5D-0A44-48FB-AC17-40D5FE6D3AAE}" type="datetimeFigureOut">
               <a:rPr lang="de-DE" smtClean="0"/>
-              <a:t>27.10.2018</a:t>
+              <a:t>28.10.2018</a:t>
             </a:fld>
             <a:endParaRPr lang="de-DE"/>
           </a:p>
@@ -4242,7 +4242,7 @@
           <a:p>
             <a:fld id="{D86E6A5D-0A44-48FB-AC17-40D5FE6D3AAE}" type="datetimeFigureOut">
               <a:rPr lang="de-DE" smtClean="0"/>
-              <a:t>27.10.2018</a:t>
+              <a:t>28.10.2018</a:t>
             </a:fld>
             <a:endParaRPr lang="de-DE"/>
           </a:p>
@@ -5973,36 +5973,6 @@
           </p:txBody>
         </p:sp>
       </p:grpSp>
-      <p:graphicFrame>
-        <p:nvGraphicFramePr>
-          <p:cNvPr id="63" name="Diagramm 62">
-            <a:extLst>
-              <a:ext uri="{FF2B5EF4-FFF2-40B4-BE49-F238E27FC236}">
-                <a16:creationId xmlns:a16="http://schemas.microsoft.com/office/drawing/2014/main" id="{75720492-A8D3-439A-8C3B-5C91C7101A1A}"/>
-              </a:ext>
-            </a:extLst>
-          </p:cNvPr>
-          <p:cNvGraphicFramePr>
-            <a:graphicFrameLocks/>
-          </p:cNvGraphicFramePr>
-          <p:nvPr>
-            <p:extLst>
-              <p:ext uri="{D42A27DB-BD31-4B8C-83A1-F6EECF244321}">
-                <p14:modId xmlns:p14="http://schemas.microsoft.com/office/powerpoint/2010/main" val="1604768225"/>
-              </p:ext>
-            </p:extLst>
-          </p:nvPr>
-        </p:nvGraphicFramePr>
-        <p:xfrm>
-          <a:off x="546796" y="3591463"/>
-          <a:ext cx="4572000" cy="2743200"/>
-        </p:xfrm>
-        <a:graphic>
-          <a:graphicData uri="http://schemas.openxmlformats.org/drawingml/2006/chart">
-            <c:chart xmlns:c="http://schemas.openxmlformats.org/drawingml/2006/chart" xmlns:r="http://schemas.openxmlformats.org/officeDocument/2006/relationships" r:id="rId2"/>
-          </a:graphicData>
-        </a:graphic>
-      </p:graphicFrame>
       <p:cxnSp>
         <p:nvCxnSpPr>
           <p:cNvPr id="67" name="Gerader Verbinder 66">
@@ -7514,6 +7484,36 @@
           </a:p>
         </p:txBody>
       </p:sp>
+      <p:graphicFrame>
+        <p:nvGraphicFramePr>
+          <p:cNvPr id="97" name="Diagramm 96">
+            <a:extLst>
+              <a:ext uri="{FF2B5EF4-FFF2-40B4-BE49-F238E27FC236}">
+                <a16:creationId xmlns:a16="http://schemas.microsoft.com/office/drawing/2014/main" id="{75720492-A8D3-439A-8C3B-5C91C7101A1A}"/>
+              </a:ext>
+            </a:extLst>
+          </p:cNvPr>
+          <p:cNvGraphicFramePr>
+            <a:graphicFrameLocks/>
+          </p:cNvGraphicFramePr>
+          <p:nvPr>
+            <p:extLst>
+              <p:ext uri="{D42A27DB-BD31-4B8C-83A1-F6EECF244321}">
+                <p14:modId xmlns:p14="http://schemas.microsoft.com/office/powerpoint/2010/main" val="4091528442"/>
+              </p:ext>
+            </p:extLst>
+          </p:nvPr>
+        </p:nvGraphicFramePr>
+        <p:xfrm>
+          <a:off x="572512" y="3575331"/>
+          <a:ext cx="4572000" cy="2743200"/>
+        </p:xfrm>
+        <a:graphic>
+          <a:graphicData uri="http://schemas.openxmlformats.org/drawingml/2006/chart">
+            <c:chart xmlns:c="http://schemas.openxmlformats.org/drawingml/2006/chart" xmlns:r="http://schemas.openxmlformats.org/officeDocument/2006/relationships" r:id="rId2"/>
+          </a:graphicData>
+        </a:graphic>
+      </p:graphicFrame>
     </p:spTree>
     <p:extLst>
       <p:ext uri="{BB962C8B-B14F-4D97-AF65-F5344CB8AC3E}">

</xml_diff>